<commit_message>
Added report and new code
</commit_message>
<xml_diff>
--- a/AXISBank/Axis Experiment.pptx
+++ b/AXISBank/Axis Experiment.pptx
@@ -10,6 +10,8 @@
     <p:sldId id="259" r:id="rId4"/>
     <p:sldId id="260" r:id="rId5"/>
     <p:sldId id="261" r:id="rId6"/>
+    <p:sldId id="262" r:id="rId7"/>
+    <p:sldId id="263" r:id="rId8"/>
   </p:sldIdLst>
   <p:sldSz cx="12192000" cy="6858000"/>
   <p:notesSz cx="6858000" cy="9144000"/>
@@ -9523,6 +9525,85 @@
           </a:p>
         </p:txBody>
       </p:sp>
+      <p:sp>
+        <p:nvSpPr>
+          <p:cNvPr id="7" name="Oval 6"/>
+          <p:cNvSpPr/>
+          <p:nvPr/>
+        </p:nvSpPr>
+        <p:spPr>
+          <a:xfrm>
+            <a:off x="6594763" y="1510145"/>
+            <a:ext cx="4447309" cy="983673"/>
+          </a:xfrm>
+          <a:prstGeom prst="ellipse">
+            <a:avLst/>
+          </a:prstGeom>
+          <a:noFill/>
+          <a:ln>
+            <a:solidFill>
+              <a:schemeClr val="tx1">
+                <a:lumMod val="95000"/>
+                <a:lumOff val="5000"/>
+              </a:schemeClr>
+            </a:solidFill>
+          </a:ln>
+        </p:spPr>
+        <p:style>
+          <a:lnRef idx="2">
+            <a:schemeClr val="accent1">
+              <a:shade val="50000"/>
+            </a:schemeClr>
+          </a:lnRef>
+          <a:fillRef idx="1">
+            <a:schemeClr val="accent1"/>
+          </a:fillRef>
+          <a:effectRef idx="0">
+            <a:schemeClr val="accent1"/>
+          </a:effectRef>
+          <a:fontRef idx="minor">
+            <a:schemeClr val="lt1"/>
+          </a:fontRef>
+        </p:style>
+        <p:txBody>
+          <a:bodyPr rtlCol="0" anchor="ctr"/>
+          <a:lstStyle/>
+          <a:p>
+            <a:pPr algn="ctr"/>
+            <a:endParaRPr lang="en-US"/>
+          </a:p>
+        </p:txBody>
+      </p:sp>
+      <p:sp>
+        <p:nvSpPr>
+          <p:cNvPr id="8" name="TextBox 7"/>
+          <p:cNvSpPr txBox="1"/>
+          <p:nvPr/>
+        </p:nvSpPr>
+        <p:spPr>
+          <a:xfrm>
+            <a:off x="10810875" y="1842655"/>
+            <a:ext cx="1415900" cy="369332"/>
+          </a:xfrm>
+          <a:prstGeom prst="rect">
+            <a:avLst/>
+          </a:prstGeom>
+          <a:noFill/>
+        </p:spPr>
+        <p:txBody>
+          <a:bodyPr wrap="none" rtlCol="0">
+            <a:spAutoFit/>
+          </a:bodyPr>
+          <a:lstStyle/>
+          <a:p>
+            <a:r>
+              <a:rPr lang="en-US" dirty="0" smtClean="0"/>
+              <a:t>Area of focus</a:t>
+            </a:r>
+            <a:endParaRPr lang="en-US" dirty="0"/>
+          </a:p>
+        </p:txBody>
+      </p:sp>
     </p:spTree>
     <p:extLst>
       <p:ext uri="{BB962C8B-B14F-4D97-AF65-F5344CB8AC3E}">
@@ -9925,13 +10006,101 @@
                   <a:schemeClr val="bg1"/>
                 </a:solidFill>
               </a:rPr>
-              <a:t>Axis Bank Experiment</a:t>
+              <a:t>Axis Bank </a:t>
+            </a:r>
+            <a:r>
+              <a:rPr lang="en-US" sz="2800" b="1" dirty="0" smtClean="0">
+                <a:solidFill>
+                  <a:schemeClr val="bg1"/>
+                </a:solidFill>
+              </a:rPr>
+              <a:t>Experiment – with Adam</a:t>
             </a:r>
             <a:endParaRPr lang="en-US" sz="2800" b="1" dirty="0">
               <a:solidFill>
                 <a:schemeClr val="bg1"/>
               </a:solidFill>
             </a:endParaRPr>
+          </a:p>
+        </p:txBody>
+      </p:sp>
+      <p:sp>
+        <p:nvSpPr>
+          <p:cNvPr id="18" name="Rectangle 17"/>
+          <p:cNvSpPr/>
+          <p:nvPr/>
+        </p:nvSpPr>
+        <p:spPr>
+          <a:xfrm>
+            <a:off x="254642" y="770572"/>
+            <a:ext cx="2974677" cy="3965206"/>
+          </a:xfrm>
+          <a:prstGeom prst="rect">
+            <a:avLst/>
+          </a:prstGeom>
+          <a:noFill/>
+          <a:ln w="38100">
+            <a:prstDash val="dash"/>
+          </a:ln>
+        </p:spPr>
+        <p:style>
+          <a:lnRef idx="2">
+            <a:schemeClr val="accent1">
+              <a:shade val="50000"/>
+            </a:schemeClr>
+          </a:lnRef>
+          <a:fillRef idx="1">
+            <a:schemeClr val="accent1"/>
+          </a:fillRef>
+          <a:effectRef idx="0">
+            <a:schemeClr val="accent1"/>
+          </a:effectRef>
+          <a:fontRef idx="minor">
+            <a:schemeClr val="lt1"/>
+          </a:fontRef>
+        </p:style>
+        <p:txBody>
+          <a:bodyPr rtlCol="0" anchor="ctr"/>
+          <a:lstStyle/>
+          <a:p>
+            <a:pPr algn="ctr"/>
+            <a:endParaRPr lang="en-US"/>
+          </a:p>
+        </p:txBody>
+      </p:sp>
+      <p:sp>
+        <p:nvSpPr>
+          <p:cNvPr id="19" name="TextBox 18"/>
+          <p:cNvSpPr txBox="1"/>
+          <p:nvPr/>
+        </p:nvSpPr>
+        <p:spPr>
+          <a:xfrm>
+            <a:off x="3740728" y="3097139"/>
+            <a:ext cx="5959773" cy="646331"/>
+          </a:xfrm>
+          <a:prstGeom prst="rect">
+            <a:avLst/>
+          </a:prstGeom>
+          <a:noFill/>
+        </p:spPr>
+        <p:txBody>
+          <a:bodyPr wrap="none" rtlCol="0">
+            <a:spAutoFit/>
+          </a:bodyPr>
+          <a:lstStyle/>
+          <a:p>
+            <a:r>
+              <a:rPr lang="en-US" dirty="0" smtClean="0"/>
+              <a:t>Over engineering of adding layers &amp; epochs does not help !!!!</a:t>
+            </a:r>
+          </a:p>
+          <a:p>
+            <a:r>
+              <a:rPr lang="en-US" dirty="0" smtClean="0"/>
+              <a:t>Dotted charts shows balanced numbers of layers and epochs</a:t>
+            </a:r>
+            <a:endParaRPr lang="en-US" dirty="0"/>
           </a:p>
         </p:txBody>
       </p:sp>
@@ -9989,10 +10158,892 @@
           </a:prstGeom>
         </p:spPr>
       </p:pic>
+      <p:sp>
+        <p:nvSpPr>
+          <p:cNvPr id="4" name="TextBox 3"/>
+          <p:cNvSpPr txBox="1"/>
+          <p:nvPr/>
+        </p:nvSpPr>
+        <p:spPr>
+          <a:xfrm>
+            <a:off x="140677" y="126608"/>
+            <a:ext cx="11704320" cy="523220"/>
+          </a:xfrm>
+          <a:prstGeom prst="rect">
+            <a:avLst/>
+          </a:prstGeom>
+          <a:noFill/>
+        </p:spPr>
+        <p:txBody>
+          <a:bodyPr wrap="square" rtlCol="0">
+            <a:spAutoFit/>
+          </a:bodyPr>
+          <a:lstStyle/>
+          <a:p>
+            <a:r>
+              <a:rPr lang="en-US" sz="2800" b="1" dirty="0" smtClean="0">
+                <a:solidFill>
+                  <a:schemeClr val="bg1"/>
+                </a:solidFill>
+              </a:rPr>
+              <a:t>Axis Bank Experiment</a:t>
+            </a:r>
+            <a:endParaRPr lang="en-US" sz="2800" b="1" dirty="0">
+              <a:solidFill>
+                <a:schemeClr val="bg1"/>
+              </a:solidFill>
+            </a:endParaRPr>
+          </a:p>
+        </p:txBody>
+      </p:sp>
     </p:spTree>
     <p:extLst>
       <p:ext uri="{BB962C8B-B14F-4D97-AF65-F5344CB8AC3E}">
         <p14:creationId xmlns:p14="http://schemas.microsoft.com/office/powerpoint/2010/main" val="3214400594"/>
+      </p:ext>
+    </p:extLst>
+  </p:cSld>
+  <p:clrMapOvr>
+    <a:masterClrMapping/>
+  </p:clrMapOvr>
+</p:sld>
+</file>
+
+<file path=ppt/slides/slide6.xml><?xml version="1.0" encoding="utf-8"?>
+<p:sld xmlns:a="http://schemas.openxmlformats.org/drawingml/2006/main" xmlns:r="http://schemas.openxmlformats.org/officeDocument/2006/relationships" xmlns:p="http://schemas.openxmlformats.org/presentationml/2006/main">
+  <p:cSld>
+    <p:spTree>
+      <p:nvGrpSpPr>
+        <p:cNvPr id="1" name=""/>
+        <p:cNvGrpSpPr/>
+        <p:nvPr/>
+      </p:nvGrpSpPr>
+      <p:grpSpPr>
+        <a:xfrm>
+          <a:off x="0" y="0"/>
+          <a:ext cx="0" cy="0"/>
+          <a:chOff x="0" y="0"/>
+          <a:chExt cx="0" cy="0"/>
+        </a:xfrm>
+      </p:grpSpPr>
+      <p:pic>
+        <p:nvPicPr>
+          <p:cNvPr id="17" name="Picture 16"/>
+          <p:cNvPicPr>
+            <a:picLocks noChangeAspect="1"/>
+          </p:cNvPicPr>
+          <p:nvPr/>
+        </p:nvPicPr>
+        <p:blipFill>
+          <a:blip r:embed="rId2"/>
+          <a:stretch>
+            <a:fillRect/>
+          </a:stretch>
+        </p:blipFill>
+        <p:spPr>
+          <a:xfrm>
+            <a:off x="7490968" y="1399309"/>
+            <a:ext cx="4498955" cy="2963467"/>
+          </a:xfrm>
+          <a:prstGeom prst="rect">
+            <a:avLst/>
+          </a:prstGeom>
+        </p:spPr>
+      </p:pic>
+      <p:sp>
+        <p:nvSpPr>
+          <p:cNvPr id="9" name="Down Arrow 8"/>
+          <p:cNvSpPr/>
+          <p:nvPr/>
+        </p:nvSpPr>
+        <p:spPr>
+          <a:xfrm>
+            <a:off x="5801250" y="3209886"/>
+            <a:ext cx="446852" cy="632753"/>
+          </a:xfrm>
+          <a:prstGeom prst="downArrow">
+            <a:avLst/>
+          </a:prstGeom>
+        </p:spPr>
+        <p:style>
+          <a:lnRef idx="2">
+            <a:schemeClr val="accent1">
+              <a:shade val="50000"/>
+            </a:schemeClr>
+          </a:lnRef>
+          <a:fillRef idx="1">
+            <a:schemeClr val="accent1"/>
+          </a:fillRef>
+          <a:effectRef idx="0">
+            <a:schemeClr val="accent1"/>
+          </a:effectRef>
+          <a:fontRef idx="minor">
+            <a:schemeClr val="lt1"/>
+          </a:fontRef>
+        </p:style>
+        <p:txBody>
+          <a:bodyPr rtlCol="0" anchor="ctr"/>
+          <a:lstStyle/>
+          <a:p>
+            <a:pPr algn="ctr"/>
+            <a:endParaRPr lang="en-US"/>
+          </a:p>
+        </p:txBody>
+      </p:sp>
+      <p:pic>
+        <p:nvPicPr>
+          <p:cNvPr id="2" name="Picture 1"/>
+          <p:cNvPicPr>
+            <a:picLocks noChangeAspect="1"/>
+          </p:cNvPicPr>
+          <p:nvPr/>
+        </p:nvPicPr>
+        <p:blipFill>
+          <a:blip r:embed="rId3"/>
+          <a:stretch>
+            <a:fillRect/>
+          </a:stretch>
+        </p:blipFill>
+        <p:spPr>
+          <a:xfrm>
+            <a:off x="239545" y="998279"/>
+            <a:ext cx="3212334" cy="2146704"/>
+          </a:xfrm>
+          <a:prstGeom prst="rect">
+            <a:avLst/>
+          </a:prstGeom>
+        </p:spPr>
+      </p:pic>
+      <p:sp>
+        <p:nvSpPr>
+          <p:cNvPr id="3" name="Rectangle 2"/>
+          <p:cNvSpPr/>
+          <p:nvPr/>
+        </p:nvSpPr>
+        <p:spPr>
+          <a:xfrm>
+            <a:off x="5971607" y="3244334"/>
+            <a:ext cx="248786" cy="369332"/>
+          </a:xfrm>
+          <a:prstGeom prst="rect">
+            <a:avLst/>
+          </a:prstGeom>
+        </p:spPr>
+        <p:txBody>
+          <a:bodyPr wrap="none">
+            <a:spAutoFit/>
+          </a:bodyPr>
+          <a:lstStyle/>
+          <a:p>
+            <a:r>
+              <a:rPr lang="en-US" dirty="0"/>
+              <a:t>￼</a:t>
+            </a:r>
+          </a:p>
+        </p:txBody>
+      </p:sp>
+      <p:pic>
+        <p:nvPicPr>
+          <p:cNvPr id="4" name="Picture 3"/>
+          <p:cNvPicPr>
+            <a:picLocks noChangeAspect="1"/>
+          </p:cNvPicPr>
+          <p:nvPr/>
+        </p:nvPicPr>
+        <p:blipFill>
+          <a:blip r:embed="rId4"/>
+          <a:stretch>
+            <a:fillRect/>
+          </a:stretch>
+        </p:blipFill>
+        <p:spPr>
+          <a:xfrm>
+            <a:off x="3929797" y="1048389"/>
+            <a:ext cx="3286017" cy="2195945"/>
+          </a:xfrm>
+          <a:prstGeom prst="rect">
+            <a:avLst/>
+          </a:prstGeom>
+        </p:spPr>
+      </p:pic>
+      <p:sp>
+        <p:nvSpPr>
+          <p:cNvPr id="5" name="Rectangle 4"/>
+          <p:cNvSpPr/>
+          <p:nvPr/>
+        </p:nvSpPr>
+        <p:spPr>
+          <a:xfrm>
+            <a:off x="5971607" y="3244334"/>
+            <a:ext cx="248786" cy="369332"/>
+          </a:xfrm>
+          <a:prstGeom prst="rect">
+            <a:avLst/>
+          </a:prstGeom>
+        </p:spPr>
+        <p:txBody>
+          <a:bodyPr wrap="none">
+            <a:spAutoFit/>
+          </a:bodyPr>
+          <a:lstStyle/>
+          <a:p>
+            <a:r>
+              <a:rPr lang="en-US" dirty="0"/>
+              <a:t>￼</a:t>
+            </a:r>
+          </a:p>
+        </p:txBody>
+      </p:sp>
+      <p:pic>
+        <p:nvPicPr>
+          <p:cNvPr id="6" name="Picture 5"/>
+          <p:cNvPicPr>
+            <a:picLocks noChangeAspect="1"/>
+          </p:cNvPicPr>
+          <p:nvPr/>
+        </p:nvPicPr>
+        <p:blipFill>
+          <a:blip r:embed="rId5"/>
+          <a:stretch>
+            <a:fillRect/>
+          </a:stretch>
+        </p:blipFill>
+        <p:spPr>
+          <a:xfrm>
+            <a:off x="11617" y="4239867"/>
+            <a:ext cx="3440262" cy="2202121"/>
+          </a:xfrm>
+          <a:prstGeom prst="rect">
+            <a:avLst/>
+          </a:prstGeom>
+        </p:spPr>
+      </p:pic>
+      <p:pic>
+        <p:nvPicPr>
+          <p:cNvPr id="7" name="Picture 6"/>
+          <p:cNvPicPr>
+            <a:picLocks noChangeAspect="1"/>
+          </p:cNvPicPr>
+          <p:nvPr/>
+        </p:nvPicPr>
+        <p:blipFill>
+          <a:blip r:embed="rId6"/>
+          <a:stretch>
+            <a:fillRect/>
+          </a:stretch>
+        </p:blipFill>
+        <p:spPr>
+          <a:xfrm>
+            <a:off x="4036577" y="4246419"/>
+            <a:ext cx="3870060" cy="2586242"/>
+          </a:xfrm>
+          <a:prstGeom prst="rect">
+            <a:avLst/>
+          </a:prstGeom>
+        </p:spPr>
+      </p:pic>
+      <p:sp>
+        <p:nvSpPr>
+          <p:cNvPr id="8" name="TextBox 7"/>
+          <p:cNvSpPr txBox="1"/>
+          <p:nvPr/>
+        </p:nvSpPr>
+        <p:spPr>
+          <a:xfrm>
+            <a:off x="1717964" y="3244334"/>
+            <a:ext cx="6017481" cy="646331"/>
+          </a:xfrm>
+          <a:prstGeom prst="rect">
+            <a:avLst/>
+          </a:prstGeom>
+          <a:noFill/>
+        </p:spPr>
+        <p:txBody>
+          <a:bodyPr wrap="none" rtlCol="0">
+            <a:spAutoFit/>
+          </a:bodyPr>
+          <a:lstStyle/>
+          <a:p>
+            <a:r>
+              <a:rPr lang="en-US" dirty="0" smtClean="0"/>
+              <a:t>Increasing one layer shows improvement in closeness to curve</a:t>
+            </a:r>
+          </a:p>
+          <a:p>
+            <a:r>
+              <a:rPr lang="en-US" dirty="0" smtClean="0"/>
+              <a:t>Additional epochs reduces the variance </a:t>
+            </a:r>
+            <a:endParaRPr lang="en-US" dirty="0"/>
+          </a:p>
+        </p:txBody>
+      </p:sp>
+      <p:sp>
+        <p:nvSpPr>
+          <p:cNvPr id="10" name="Right Arrow 9"/>
+          <p:cNvSpPr/>
+          <p:nvPr/>
+        </p:nvSpPr>
+        <p:spPr>
+          <a:xfrm>
+            <a:off x="3304918" y="1699365"/>
+            <a:ext cx="569530" cy="665018"/>
+          </a:xfrm>
+          <a:prstGeom prst="rightArrow">
+            <a:avLst/>
+          </a:prstGeom>
+        </p:spPr>
+        <p:style>
+          <a:lnRef idx="2">
+            <a:schemeClr val="accent1">
+              <a:shade val="50000"/>
+            </a:schemeClr>
+          </a:lnRef>
+          <a:fillRef idx="1">
+            <a:schemeClr val="accent1"/>
+          </a:fillRef>
+          <a:effectRef idx="0">
+            <a:schemeClr val="accent1"/>
+          </a:effectRef>
+          <a:fontRef idx="minor">
+            <a:schemeClr val="lt1"/>
+          </a:fontRef>
+        </p:style>
+        <p:txBody>
+          <a:bodyPr rtlCol="0" anchor="ctr"/>
+          <a:lstStyle/>
+          <a:p>
+            <a:pPr algn="ctr"/>
+            <a:endParaRPr lang="en-US"/>
+          </a:p>
+        </p:txBody>
+      </p:sp>
+      <p:sp>
+        <p:nvSpPr>
+          <p:cNvPr id="11" name="Oval 10"/>
+          <p:cNvSpPr/>
+          <p:nvPr/>
+        </p:nvSpPr>
+        <p:spPr>
+          <a:xfrm rot="21124907">
+            <a:off x="646344" y="1093614"/>
+            <a:ext cx="1856509" cy="480165"/>
+          </a:xfrm>
+          <a:prstGeom prst="ellipse">
+            <a:avLst/>
+          </a:prstGeom>
+          <a:noFill/>
+        </p:spPr>
+        <p:style>
+          <a:lnRef idx="2">
+            <a:schemeClr val="accent1">
+              <a:shade val="50000"/>
+            </a:schemeClr>
+          </a:lnRef>
+          <a:fillRef idx="1">
+            <a:schemeClr val="accent1"/>
+          </a:fillRef>
+          <a:effectRef idx="0">
+            <a:schemeClr val="accent1"/>
+          </a:effectRef>
+          <a:fontRef idx="minor">
+            <a:schemeClr val="lt1"/>
+          </a:fontRef>
+        </p:style>
+        <p:txBody>
+          <a:bodyPr rtlCol="0" anchor="ctr"/>
+          <a:lstStyle/>
+          <a:p>
+            <a:pPr algn="ctr"/>
+            <a:endParaRPr lang="en-US"/>
+          </a:p>
+        </p:txBody>
+      </p:sp>
+      <p:sp>
+        <p:nvSpPr>
+          <p:cNvPr id="12" name="Oval 11"/>
+          <p:cNvSpPr/>
+          <p:nvPr/>
+        </p:nvSpPr>
+        <p:spPr>
+          <a:xfrm rot="21124907">
+            <a:off x="570807" y="2306363"/>
+            <a:ext cx="1856509" cy="480165"/>
+          </a:xfrm>
+          <a:prstGeom prst="ellipse">
+            <a:avLst/>
+          </a:prstGeom>
+          <a:noFill/>
+          <a:ln>
+            <a:solidFill>
+              <a:schemeClr val="tx1">
+                <a:lumMod val="95000"/>
+                <a:lumOff val="5000"/>
+              </a:schemeClr>
+            </a:solidFill>
+          </a:ln>
+        </p:spPr>
+        <p:style>
+          <a:lnRef idx="2">
+            <a:schemeClr val="accent1">
+              <a:shade val="50000"/>
+            </a:schemeClr>
+          </a:lnRef>
+          <a:fillRef idx="1">
+            <a:schemeClr val="accent1"/>
+          </a:fillRef>
+          <a:effectRef idx="0">
+            <a:schemeClr val="accent1"/>
+          </a:effectRef>
+          <a:fontRef idx="minor">
+            <a:schemeClr val="lt1"/>
+          </a:fontRef>
+        </p:style>
+        <p:txBody>
+          <a:bodyPr rtlCol="0" anchor="ctr"/>
+          <a:lstStyle/>
+          <a:p>
+            <a:pPr algn="ctr"/>
+            <a:endParaRPr lang="en-US"/>
+          </a:p>
+        </p:txBody>
+      </p:sp>
+      <p:sp>
+        <p:nvSpPr>
+          <p:cNvPr id="13" name="Oval 12"/>
+          <p:cNvSpPr/>
+          <p:nvPr/>
+        </p:nvSpPr>
+        <p:spPr>
+          <a:xfrm rot="21124907">
+            <a:off x="4197712" y="1264990"/>
+            <a:ext cx="1856509" cy="735039"/>
+          </a:xfrm>
+          <a:prstGeom prst="ellipse">
+            <a:avLst/>
+          </a:prstGeom>
+          <a:noFill/>
+        </p:spPr>
+        <p:style>
+          <a:lnRef idx="2">
+            <a:schemeClr val="accent1">
+              <a:shade val="50000"/>
+            </a:schemeClr>
+          </a:lnRef>
+          <a:fillRef idx="1">
+            <a:schemeClr val="accent1"/>
+          </a:fillRef>
+          <a:effectRef idx="0">
+            <a:schemeClr val="accent1"/>
+          </a:effectRef>
+          <a:fontRef idx="minor">
+            <a:schemeClr val="lt1"/>
+          </a:fontRef>
+        </p:style>
+        <p:txBody>
+          <a:bodyPr rtlCol="0" anchor="ctr"/>
+          <a:lstStyle/>
+          <a:p>
+            <a:pPr algn="ctr"/>
+            <a:endParaRPr lang="en-US"/>
+          </a:p>
+        </p:txBody>
+      </p:sp>
+      <p:sp>
+        <p:nvSpPr>
+          <p:cNvPr id="14" name="Oval 13"/>
+          <p:cNvSpPr/>
+          <p:nvPr/>
+        </p:nvSpPr>
+        <p:spPr>
+          <a:xfrm rot="19900683">
+            <a:off x="4214805" y="2096788"/>
+            <a:ext cx="2026287" cy="552799"/>
+          </a:xfrm>
+          <a:prstGeom prst="ellipse">
+            <a:avLst/>
+          </a:prstGeom>
+          <a:noFill/>
+          <a:ln>
+            <a:solidFill>
+              <a:schemeClr val="tx1">
+                <a:lumMod val="95000"/>
+                <a:lumOff val="5000"/>
+              </a:schemeClr>
+            </a:solidFill>
+          </a:ln>
+        </p:spPr>
+        <p:style>
+          <a:lnRef idx="2">
+            <a:schemeClr val="accent1">
+              <a:shade val="50000"/>
+            </a:schemeClr>
+          </a:lnRef>
+          <a:fillRef idx="1">
+            <a:schemeClr val="accent1"/>
+          </a:fillRef>
+          <a:effectRef idx="0">
+            <a:schemeClr val="accent1"/>
+          </a:effectRef>
+          <a:fontRef idx="minor">
+            <a:schemeClr val="lt1"/>
+          </a:fontRef>
+        </p:style>
+        <p:txBody>
+          <a:bodyPr rtlCol="0" anchor="ctr"/>
+          <a:lstStyle/>
+          <a:p>
+            <a:pPr algn="ctr"/>
+            <a:endParaRPr lang="en-US"/>
+          </a:p>
+        </p:txBody>
+      </p:sp>
+      <p:sp>
+        <p:nvSpPr>
+          <p:cNvPr id="15" name="Oval 14"/>
+          <p:cNvSpPr/>
+          <p:nvPr/>
+        </p:nvSpPr>
+        <p:spPr>
+          <a:xfrm rot="21124907">
+            <a:off x="4597645" y="4301414"/>
+            <a:ext cx="1967921" cy="2020635"/>
+          </a:xfrm>
+          <a:prstGeom prst="ellipse">
+            <a:avLst/>
+          </a:prstGeom>
+          <a:noFill/>
+          <a:ln w="38100"/>
+        </p:spPr>
+        <p:style>
+          <a:lnRef idx="2">
+            <a:schemeClr val="accent1">
+              <a:shade val="50000"/>
+            </a:schemeClr>
+          </a:lnRef>
+          <a:fillRef idx="1">
+            <a:schemeClr val="accent1"/>
+          </a:fillRef>
+          <a:effectRef idx="0">
+            <a:schemeClr val="accent1"/>
+          </a:effectRef>
+          <a:fontRef idx="minor">
+            <a:schemeClr val="lt1"/>
+          </a:fontRef>
+        </p:style>
+        <p:txBody>
+          <a:bodyPr rtlCol="0" anchor="ctr"/>
+          <a:lstStyle/>
+          <a:p>
+            <a:pPr algn="ctr"/>
+            <a:endParaRPr lang="en-US"/>
+          </a:p>
+        </p:txBody>
+      </p:sp>
+      <p:sp>
+        <p:nvSpPr>
+          <p:cNvPr id="16" name="Oval 15"/>
+          <p:cNvSpPr/>
+          <p:nvPr/>
+        </p:nvSpPr>
+        <p:spPr>
+          <a:xfrm rot="20409516">
+            <a:off x="4435584" y="4961676"/>
+            <a:ext cx="2008905" cy="867292"/>
+          </a:xfrm>
+          <a:prstGeom prst="ellipse">
+            <a:avLst/>
+          </a:prstGeom>
+          <a:noFill/>
+          <a:ln w="38100">
+            <a:solidFill>
+              <a:schemeClr val="tx1">
+                <a:lumMod val="95000"/>
+                <a:lumOff val="5000"/>
+              </a:schemeClr>
+            </a:solidFill>
+          </a:ln>
+        </p:spPr>
+        <p:style>
+          <a:lnRef idx="2">
+            <a:schemeClr val="accent1">
+              <a:shade val="50000"/>
+            </a:schemeClr>
+          </a:lnRef>
+          <a:fillRef idx="1">
+            <a:schemeClr val="accent1"/>
+          </a:fillRef>
+          <a:effectRef idx="0">
+            <a:schemeClr val="accent1"/>
+          </a:effectRef>
+          <a:fontRef idx="minor">
+            <a:schemeClr val="lt1"/>
+          </a:fontRef>
+        </p:style>
+        <p:txBody>
+          <a:bodyPr rtlCol="0" anchor="ctr"/>
+          <a:lstStyle/>
+          <a:p>
+            <a:pPr algn="ctr"/>
+            <a:endParaRPr lang="en-US"/>
+          </a:p>
+        </p:txBody>
+      </p:sp>
+      <p:sp>
+        <p:nvSpPr>
+          <p:cNvPr id="24" name="TextBox 23"/>
+          <p:cNvSpPr txBox="1"/>
+          <p:nvPr/>
+        </p:nvSpPr>
+        <p:spPr>
+          <a:xfrm>
+            <a:off x="9173269" y="1635487"/>
+            <a:ext cx="3171189" cy="646331"/>
+          </a:xfrm>
+          <a:prstGeom prst="rect">
+            <a:avLst/>
+          </a:prstGeom>
+          <a:noFill/>
+        </p:spPr>
+        <p:txBody>
+          <a:bodyPr wrap="none" rtlCol="0">
+            <a:spAutoFit/>
+          </a:bodyPr>
+          <a:lstStyle/>
+          <a:p>
+            <a:r>
+              <a:rPr lang="en-US" dirty="0" err="1" smtClean="0"/>
+              <a:t>Skyblue</a:t>
+            </a:r>
+            <a:r>
+              <a:rPr lang="en-US" dirty="0" smtClean="0"/>
+              <a:t> – 4 layers / 60 epochs</a:t>
+            </a:r>
+          </a:p>
+          <a:p>
+            <a:r>
+              <a:rPr lang="en-US" dirty="0" err="1" smtClean="0"/>
+              <a:t>Darkblue</a:t>
+            </a:r>
+            <a:r>
+              <a:rPr lang="en-US" dirty="0" smtClean="0"/>
+              <a:t> – 3 layers / 60 epochs </a:t>
+            </a:r>
+            <a:endParaRPr lang="en-US" dirty="0"/>
+          </a:p>
+        </p:txBody>
+      </p:sp>
+      <p:sp>
+        <p:nvSpPr>
+          <p:cNvPr id="25" name="TextBox 24"/>
+          <p:cNvSpPr txBox="1"/>
+          <p:nvPr/>
+        </p:nvSpPr>
+        <p:spPr>
+          <a:xfrm>
+            <a:off x="140677" y="126608"/>
+            <a:ext cx="11704320" cy="523220"/>
+          </a:xfrm>
+          <a:prstGeom prst="rect">
+            <a:avLst/>
+          </a:prstGeom>
+          <a:noFill/>
+        </p:spPr>
+        <p:txBody>
+          <a:bodyPr wrap="square" rtlCol="0">
+            <a:spAutoFit/>
+          </a:bodyPr>
+          <a:lstStyle/>
+          <a:p>
+            <a:r>
+              <a:rPr lang="en-US" sz="2800" b="1" dirty="0" smtClean="0">
+                <a:solidFill>
+                  <a:schemeClr val="bg1"/>
+                </a:solidFill>
+              </a:rPr>
+              <a:t>Axis Bank </a:t>
+            </a:r>
+            <a:r>
+              <a:rPr lang="en-US" sz="2800" b="1" dirty="0" smtClean="0">
+                <a:solidFill>
+                  <a:schemeClr val="bg1"/>
+                </a:solidFill>
+              </a:rPr>
+              <a:t>Experiment – with </a:t>
+            </a:r>
+            <a:r>
+              <a:rPr lang="en-US" sz="2800" b="1" dirty="0" err="1" smtClean="0">
+                <a:solidFill>
+                  <a:schemeClr val="bg1"/>
+                </a:solidFill>
+              </a:rPr>
+              <a:t>Adadelta</a:t>
+            </a:r>
+            <a:endParaRPr lang="en-US" sz="2800" b="1" dirty="0">
+              <a:solidFill>
+                <a:schemeClr val="bg1"/>
+              </a:solidFill>
+            </a:endParaRPr>
+          </a:p>
+        </p:txBody>
+      </p:sp>
+    </p:spTree>
+    <p:extLst>
+      <p:ext uri="{BB962C8B-B14F-4D97-AF65-F5344CB8AC3E}">
+        <p14:creationId xmlns:p14="http://schemas.microsoft.com/office/powerpoint/2010/main" val="3835838422"/>
+      </p:ext>
+    </p:extLst>
+  </p:cSld>
+  <p:clrMapOvr>
+    <a:masterClrMapping/>
+  </p:clrMapOvr>
+</p:sld>
+</file>
+
+<file path=ppt/slides/slide7.xml><?xml version="1.0" encoding="utf-8"?>
+<p:sld xmlns:a="http://schemas.openxmlformats.org/drawingml/2006/main" xmlns:r="http://schemas.openxmlformats.org/officeDocument/2006/relationships" xmlns:p="http://schemas.openxmlformats.org/presentationml/2006/main">
+  <p:cSld>
+    <p:spTree>
+      <p:nvGrpSpPr>
+        <p:cNvPr id="1" name=""/>
+        <p:cNvGrpSpPr/>
+        <p:nvPr/>
+      </p:nvGrpSpPr>
+      <p:grpSpPr>
+        <a:xfrm>
+          <a:off x="0" y="0"/>
+          <a:ext cx="0" cy="0"/>
+          <a:chOff x="0" y="0"/>
+          <a:chExt cx="0" cy="0"/>
+        </a:xfrm>
+      </p:grpSpPr>
+      <p:pic>
+        <p:nvPicPr>
+          <p:cNvPr id="2" name="Picture 1"/>
+          <p:cNvPicPr>
+            <a:picLocks noChangeAspect="1"/>
+          </p:cNvPicPr>
+          <p:nvPr/>
+        </p:nvPicPr>
+        <p:blipFill>
+          <a:blip r:embed="rId2"/>
+          <a:stretch>
+            <a:fillRect/>
+          </a:stretch>
+        </p:blipFill>
+        <p:spPr>
+          <a:xfrm>
+            <a:off x="354427" y="984425"/>
+            <a:ext cx="4628001" cy="3130376"/>
+          </a:xfrm>
+          <a:prstGeom prst="rect">
+            <a:avLst/>
+          </a:prstGeom>
+        </p:spPr>
+      </p:pic>
+      <p:pic>
+        <p:nvPicPr>
+          <p:cNvPr id="3" name="Picture 2"/>
+          <p:cNvPicPr>
+            <a:picLocks noChangeAspect="1"/>
+          </p:cNvPicPr>
+          <p:nvPr/>
+        </p:nvPicPr>
+        <p:blipFill>
+          <a:blip r:embed="rId3"/>
+          <a:stretch>
+            <a:fillRect/>
+          </a:stretch>
+        </p:blipFill>
+        <p:spPr>
+          <a:xfrm>
+            <a:off x="5342647" y="3768436"/>
+            <a:ext cx="3850766" cy="2604655"/>
+          </a:xfrm>
+          <a:prstGeom prst="rect">
+            <a:avLst/>
+          </a:prstGeom>
+        </p:spPr>
+      </p:pic>
+      <p:pic>
+        <p:nvPicPr>
+          <p:cNvPr id="4" name="Picture 3"/>
+          <p:cNvPicPr>
+            <a:picLocks noChangeAspect="1"/>
+          </p:cNvPicPr>
+          <p:nvPr/>
+        </p:nvPicPr>
+        <p:blipFill>
+          <a:blip r:embed="rId4"/>
+          <a:stretch>
+            <a:fillRect/>
+          </a:stretch>
+        </p:blipFill>
+        <p:spPr>
+          <a:xfrm>
+            <a:off x="5696007" y="1269866"/>
+            <a:ext cx="3541568" cy="1746962"/>
+          </a:xfrm>
+          <a:prstGeom prst="rect">
+            <a:avLst/>
+          </a:prstGeom>
+        </p:spPr>
+      </p:pic>
+      <p:sp>
+        <p:nvSpPr>
+          <p:cNvPr id="5" name="Rectangle 4"/>
+          <p:cNvSpPr/>
+          <p:nvPr/>
+        </p:nvSpPr>
+        <p:spPr>
+          <a:xfrm>
+            <a:off x="1163782" y="4599709"/>
+            <a:ext cx="3158836" cy="1593273"/>
+          </a:xfrm>
+          <a:prstGeom prst="rect">
+            <a:avLst/>
+          </a:prstGeom>
+        </p:spPr>
+        <p:style>
+          <a:lnRef idx="2">
+            <a:schemeClr val="accent1">
+              <a:shade val="50000"/>
+            </a:schemeClr>
+          </a:lnRef>
+          <a:fillRef idx="1">
+            <a:schemeClr val="accent1"/>
+          </a:fillRef>
+          <a:effectRef idx="0">
+            <a:schemeClr val="accent1"/>
+          </a:effectRef>
+          <a:fontRef idx="minor">
+            <a:schemeClr val="lt1"/>
+          </a:fontRef>
+        </p:style>
+        <p:txBody>
+          <a:bodyPr rtlCol="0" anchor="ctr"/>
+          <a:lstStyle/>
+          <a:p>
+            <a:pPr algn="ctr"/>
+            <a:r>
+              <a:rPr lang="en-US" dirty="0" smtClean="0"/>
+              <a:t>Need to understand – </a:t>
+            </a:r>
+          </a:p>
+          <a:p>
+            <a:pPr algn="ctr"/>
+            <a:r>
+              <a:rPr lang="en-US" dirty="0" smtClean="0"/>
+              <a:t>- Loss in decreasing by adding epochs from 60 to 80 but its increasing variance </a:t>
+            </a:r>
+            <a:endParaRPr lang="en-US" dirty="0"/>
+          </a:p>
+        </p:txBody>
+      </p:sp>
+    </p:spTree>
+    <p:extLst>
+      <p:ext uri="{BB962C8B-B14F-4D97-AF65-F5344CB8AC3E}">
+        <p14:creationId xmlns:p14="http://schemas.microsoft.com/office/powerpoint/2010/main" val="303836741"/>
       </p:ext>
     </p:extLst>
   </p:cSld>

</xml_diff>